<commit_message>
Powerpoint afgewerkt en permissies stop_docker aangepast
</commit_message>
<xml_diff>
--- a/defense.pptx
+++ b/defense.pptx
@@ -6,10 +6,10 @@
     <p:sldMasterId id="2147483694" r:id="rId2"/>
   </p:sldMasterIdLst>
   <p:notesMasterIdLst>
-    <p:notesMasterId r:id="rId24"/>
+    <p:notesMasterId r:id="rId26"/>
   </p:notesMasterIdLst>
   <p:handoutMasterIdLst>
-    <p:handoutMasterId r:id="rId25"/>
+    <p:handoutMasterId r:id="rId27"/>
   </p:handoutMasterIdLst>
   <p:sldIdLst>
     <p:sldId id="261" r:id="rId3"/>
@@ -33,6 +33,8 @@
     <p:sldId id="279" r:id="rId21"/>
     <p:sldId id="280" r:id="rId22"/>
     <p:sldId id="281" r:id="rId23"/>
+    <p:sldId id="282" r:id="rId24"/>
+    <p:sldId id="283" r:id="rId25"/>
   </p:sldIdLst>
   <p:sldSz cx="12192000" cy="6858000"/>
   <p:notesSz cx="6858000" cy="9144000"/>
@@ -13994,6 +13996,47 @@
               <a:t>)</a:t>
             </a:r>
           </a:p>
+          <a:p>
+            <a:pPr lvl="1"/>
+            <a:r>
+              <a:rPr lang="en-BE" dirty="0"/>
+              <a:t>Webserver starten</a:t>
+            </a:r>
+          </a:p>
+          <a:p>
+            <a:pPr lvl="1"/>
+            <a:endParaRPr lang="en-BE" dirty="0"/>
+          </a:p>
+          <a:p>
+            <a:r>
+              <a:rPr lang="en-BE" dirty="0"/>
+              <a:t>Script </a:t>
+            </a:r>
+            <a:r>
+              <a:rPr lang="en-BE" dirty="0">
+                <a:latin typeface="Andale Mono" panose="020B0509000000000004" pitchFamily="49" charset="0"/>
+              </a:rPr>
+              <a:t>stop_docker.sh</a:t>
+            </a:r>
+          </a:p>
+          <a:p>
+            <a:pPr lvl="1"/>
+            <a:r>
+              <a:rPr lang="en-BE" dirty="0"/>
+              <a:t>Sluit Docker container met bepaalde ID (cmldarg) af</a:t>
+            </a:r>
+          </a:p>
+          <a:p>
+            <a:pPr lvl="1"/>
+            <a:r>
+              <a:rPr lang="en-BE" dirty="0"/>
+              <a:t>Kopieert de history file naar de </a:t>
+            </a:r>
+            <a:r>
+              <a:rPr lang="en-BE" i="1" dirty="0"/>
+              <a:t>working directory</a:t>
+            </a:r>
+          </a:p>
         </p:txBody>
       </p:sp>
       <p:sp>
@@ -14085,6 +14128,433 @@
     <p:extLst>
       <p:ext uri="{BB962C8B-B14F-4D97-AF65-F5344CB8AC3E}">
         <p14:creationId xmlns:p14="http://schemas.microsoft.com/office/powerpoint/2010/main" val="3360247783"/>
+      </p:ext>
+    </p:extLst>
+  </p:cSld>
+  <p:clrMapOvr>
+    <a:masterClrMapping/>
+  </p:clrMapOvr>
+  <p:timing>
+    <p:tnLst>
+      <p:par>
+        <p:cTn id="1" dur="indefinite" restart="never" nodeType="tmRoot">
+          <p:childTnLst>
+            <p:seq concurrent="1" nextAc="seek">
+              <p:cTn id="2" dur="indefinite" nodeType="mainSeq">
+                <p:childTnLst>
+                  <p:par>
+                    <p:cTn id="3" fill="hold">
+                      <p:stCondLst>
+                        <p:cond delay="indefinite"/>
+                      </p:stCondLst>
+                      <p:childTnLst>
+                        <p:par>
+                          <p:cTn id="4" fill="hold">
+                            <p:stCondLst>
+                              <p:cond delay="0"/>
+                            </p:stCondLst>
+                            <p:childTnLst>
+                              <p:par>
+                                <p:cTn id="5" presetID="1" presetClass="entr" presetSubtype="0" fill="hold" nodeType="clickEffect">
+                                  <p:stCondLst>
+                                    <p:cond delay="0"/>
+                                  </p:stCondLst>
+                                  <p:childTnLst>
+                                    <p:set>
+                                      <p:cBhvr>
+                                        <p:cTn id="6" dur="1" fill="hold">
+                                          <p:stCondLst>
+                                            <p:cond delay="0"/>
+                                          </p:stCondLst>
+                                        </p:cTn>
+                                        <p:tgtEl>
+                                          <p:spTgt spid="2">
+                                            <p:txEl>
+                                              <p:pRg st="5" end="5"/>
+                                            </p:txEl>
+                                          </p:spTgt>
+                                        </p:tgtEl>
+                                        <p:attrNameLst>
+                                          <p:attrName>style.visibility</p:attrName>
+                                        </p:attrNameLst>
+                                      </p:cBhvr>
+                                      <p:to>
+                                        <p:strVal val="visible"/>
+                                      </p:to>
+                                    </p:set>
+                                  </p:childTnLst>
+                                </p:cTn>
+                              </p:par>
+                              <p:par>
+                                <p:cTn id="7" presetID="1" presetClass="entr" presetSubtype="0" fill="hold" nodeType="withEffect">
+                                  <p:stCondLst>
+                                    <p:cond delay="0"/>
+                                  </p:stCondLst>
+                                  <p:childTnLst>
+                                    <p:set>
+                                      <p:cBhvr>
+                                        <p:cTn id="8" dur="1" fill="hold">
+                                          <p:stCondLst>
+                                            <p:cond delay="0"/>
+                                          </p:stCondLst>
+                                        </p:cTn>
+                                        <p:tgtEl>
+                                          <p:spTgt spid="2">
+                                            <p:txEl>
+                                              <p:pRg st="6" end="6"/>
+                                            </p:txEl>
+                                          </p:spTgt>
+                                        </p:tgtEl>
+                                        <p:attrNameLst>
+                                          <p:attrName>style.visibility</p:attrName>
+                                        </p:attrNameLst>
+                                      </p:cBhvr>
+                                      <p:to>
+                                        <p:strVal val="visible"/>
+                                      </p:to>
+                                    </p:set>
+                                  </p:childTnLst>
+                                </p:cTn>
+                              </p:par>
+                              <p:par>
+                                <p:cTn id="9" presetID="1" presetClass="entr" presetSubtype="0" fill="hold" nodeType="withEffect">
+                                  <p:stCondLst>
+                                    <p:cond delay="0"/>
+                                  </p:stCondLst>
+                                  <p:childTnLst>
+                                    <p:set>
+                                      <p:cBhvr>
+                                        <p:cTn id="10" dur="1" fill="hold">
+                                          <p:stCondLst>
+                                            <p:cond delay="0"/>
+                                          </p:stCondLst>
+                                        </p:cTn>
+                                        <p:tgtEl>
+                                          <p:spTgt spid="2">
+                                            <p:txEl>
+                                              <p:pRg st="7" end="7"/>
+                                            </p:txEl>
+                                          </p:spTgt>
+                                        </p:tgtEl>
+                                        <p:attrNameLst>
+                                          <p:attrName>style.visibility</p:attrName>
+                                        </p:attrNameLst>
+                                      </p:cBhvr>
+                                      <p:to>
+                                        <p:strVal val="visible"/>
+                                      </p:to>
+                                    </p:set>
+                                  </p:childTnLst>
+                                </p:cTn>
+                              </p:par>
+                            </p:childTnLst>
+                          </p:cTn>
+                        </p:par>
+                      </p:childTnLst>
+                    </p:cTn>
+                  </p:par>
+                </p:childTnLst>
+              </p:cTn>
+              <p:prevCondLst>
+                <p:cond evt="onPrev" delay="0">
+                  <p:tgtEl>
+                    <p:sldTgt/>
+                  </p:tgtEl>
+                </p:cond>
+              </p:prevCondLst>
+              <p:nextCondLst>
+                <p:cond evt="onNext" delay="0">
+                  <p:tgtEl>
+                    <p:sldTgt/>
+                  </p:tgtEl>
+                </p:cond>
+              </p:nextCondLst>
+            </p:seq>
+          </p:childTnLst>
+        </p:cTn>
+      </p:par>
+    </p:tnLst>
+  </p:timing>
+</p:sld>
+</file>
+
+<file path=ppt/slides/slide22.xml><?xml version="1.0" encoding="utf-8"?>
+<p:sld xmlns:a="http://schemas.openxmlformats.org/drawingml/2006/main" xmlns:r="http://schemas.openxmlformats.org/officeDocument/2006/relationships" xmlns:p="http://schemas.openxmlformats.org/presentationml/2006/main">
+  <p:cSld>
+    <p:spTree>
+      <p:nvGrpSpPr>
+        <p:cNvPr id="1" name=""/>
+        <p:cNvGrpSpPr/>
+        <p:nvPr/>
+      </p:nvGrpSpPr>
+      <p:grpSpPr>
+        <a:xfrm>
+          <a:off x="0" y="0"/>
+          <a:ext cx="0" cy="0"/>
+          <a:chOff x="0" y="0"/>
+          <a:chExt cx="0" cy="0"/>
+        </a:xfrm>
+      </p:grpSpPr>
+      <p:sp>
+        <p:nvSpPr>
+          <p:cNvPr id="2" name="Footer Placeholder 1">
+            <a:extLst>
+              <a:ext uri="{FF2B5EF4-FFF2-40B4-BE49-F238E27FC236}">
+                <a16:creationId xmlns:a16="http://schemas.microsoft.com/office/drawing/2014/main" id="{97BD2E06-97E2-4B02-62F1-9A6FCE397436}"/>
+              </a:ext>
+            </a:extLst>
+          </p:cNvPr>
+          <p:cNvSpPr>
+            <a:spLocks noGrp="1"/>
+          </p:cNvSpPr>
+          <p:nvPr>
+            <p:ph type="ftr" sz="quarter" idx="11"/>
+          </p:nvPr>
+        </p:nvSpPr>
+        <p:spPr/>
+        <p:txBody>
+          <a:bodyPr/>
+          <a:lstStyle/>
+          <a:p>
+            <a:r>
+              <a:rPr lang="nl-NL"/>
+              <a:t>Groep W&amp;T - Computerwetenschappen</a:t>
+            </a:r>
+          </a:p>
+        </p:txBody>
+      </p:sp>
+      <p:sp>
+        <p:nvSpPr>
+          <p:cNvPr id="3" name="Slide Number Placeholder 2">
+            <a:extLst>
+              <a:ext uri="{FF2B5EF4-FFF2-40B4-BE49-F238E27FC236}">
+                <a16:creationId xmlns:a16="http://schemas.microsoft.com/office/drawing/2014/main" id="{5F2F6358-CD1F-4B72-4A75-E675002413BF}"/>
+              </a:ext>
+            </a:extLst>
+          </p:cNvPr>
+          <p:cNvSpPr>
+            <a:spLocks noGrp="1"/>
+          </p:cNvSpPr>
+          <p:nvPr>
+            <p:ph type="sldNum" sz="quarter" idx="12"/>
+          </p:nvPr>
+        </p:nvSpPr>
+        <p:spPr/>
+        <p:txBody>
+          <a:bodyPr/>
+          <a:lstStyle/>
+          <a:p>
+            <a:fld id="{CF179DAE-D0A6-40C3-B8BC-6A97C268D03A}" type="slidenum">
+              <a:rPr lang="nl-NL" smtClean="0"/>
+              <a:t>22</a:t>
+            </a:fld>
+            <a:endParaRPr lang="nl-NL"/>
+          </a:p>
+        </p:txBody>
+      </p:sp>
+      <p:sp>
+        <p:nvSpPr>
+          <p:cNvPr id="4" name="Title 3">
+            <a:extLst>
+              <a:ext uri="{FF2B5EF4-FFF2-40B4-BE49-F238E27FC236}">
+                <a16:creationId xmlns:a16="http://schemas.microsoft.com/office/drawing/2014/main" id="{C182BD8A-6938-AFEB-7B00-A42FCF1C3B81}"/>
+              </a:ext>
+            </a:extLst>
+          </p:cNvPr>
+          <p:cNvSpPr>
+            <a:spLocks noGrp="1"/>
+          </p:cNvSpPr>
+          <p:nvPr>
+            <p:ph type="title"/>
+          </p:nvPr>
+        </p:nvSpPr>
+        <p:spPr/>
+        <p:txBody>
+          <a:bodyPr/>
+          <a:lstStyle/>
+          <a:p>
+            <a:r>
+              <a:rPr lang="en-BE" dirty="0"/>
+              <a:t>Voorlopig al vragen?</a:t>
+            </a:r>
+          </a:p>
+        </p:txBody>
+      </p:sp>
+      <p:sp>
+        <p:nvSpPr>
+          <p:cNvPr id="5" name="Text Placeholder 4">
+            <a:extLst>
+              <a:ext uri="{FF2B5EF4-FFF2-40B4-BE49-F238E27FC236}">
+                <a16:creationId xmlns:a16="http://schemas.microsoft.com/office/drawing/2014/main" id="{D8E3D6D6-0A7F-309B-3644-A6179F1B57E9}"/>
+              </a:ext>
+            </a:extLst>
+          </p:cNvPr>
+          <p:cNvSpPr>
+            <a:spLocks noGrp="1"/>
+          </p:cNvSpPr>
+          <p:nvPr>
+            <p:ph type="body" idx="1"/>
+          </p:nvPr>
+        </p:nvSpPr>
+        <p:spPr/>
+        <p:txBody>
+          <a:bodyPr/>
+          <a:lstStyle/>
+          <a:p>
+            <a:r>
+              <a:rPr lang="en-BE" dirty="0"/>
+              <a:t>Indien niet, volgt nu een demonstratie.</a:t>
+            </a:r>
+          </a:p>
+        </p:txBody>
+      </p:sp>
+    </p:spTree>
+    <p:extLst>
+      <p:ext uri="{BB962C8B-B14F-4D97-AF65-F5344CB8AC3E}">
+        <p14:creationId xmlns:p14="http://schemas.microsoft.com/office/powerpoint/2010/main" val="3648244936"/>
+      </p:ext>
+    </p:extLst>
+  </p:cSld>
+  <p:clrMapOvr>
+    <a:masterClrMapping/>
+  </p:clrMapOvr>
+</p:sld>
+</file>
+
+<file path=ppt/slides/slide23.xml><?xml version="1.0" encoding="utf-8"?>
+<p:sld xmlns:a="http://schemas.openxmlformats.org/drawingml/2006/main" xmlns:r="http://schemas.openxmlformats.org/officeDocument/2006/relationships" xmlns:p="http://schemas.openxmlformats.org/presentationml/2006/main">
+  <p:cSld>
+    <p:spTree>
+      <p:nvGrpSpPr>
+        <p:cNvPr id="1" name=""/>
+        <p:cNvGrpSpPr/>
+        <p:nvPr/>
+      </p:nvGrpSpPr>
+      <p:grpSpPr>
+        <a:xfrm>
+          <a:off x="0" y="0"/>
+          <a:ext cx="0" cy="0"/>
+          <a:chOff x="0" y="0"/>
+          <a:chExt cx="0" cy="0"/>
+        </a:xfrm>
+      </p:grpSpPr>
+      <p:sp>
+        <p:nvSpPr>
+          <p:cNvPr id="2" name="Footer Placeholder 1">
+            <a:extLst>
+              <a:ext uri="{FF2B5EF4-FFF2-40B4-BE49-F238E27FC236}">
+                <a16:creationId xmlns:a16="http://schemas.microsoft.com/office/drawing/2014/main" id="{2E14065E-0657-3AEA-9549-DC2E6D145E4A}"/>
+              </a:ext>
+            </a:extLst>
+          </p:cNvPr>
+          <p:cNvSpPr>
+            <a:spLocks noGrp="1"/>
+          </p:cNvSpPr>
+          <p:nvPr>
+            <p:ph type="ftr" sz="quarter" idx="11"/>
+          </p:nvPr>
+        </p:nvSpPr>
+        <p:spPr/>
+        <p:txBody>
+          <a:bodyPr/>
+          <a:lstStyle/>
+          <a:p>
+            <a:r>
+              <a:rPr lang="nl-NL"/>
+              <a:t>Groep W&amp;T - Computerwetenschappen</a:t>
+            </a:r>
+          </a:p>
+        </p:txBody>
+      </p:sp>
+      <p:sp>
+        <p:nvSpPr>
+          <p:cNvPr id="3" name="Slide Number Placeholder 2">
+            <a:extLst>
+              <a:ext uri="{FF2B5EF4-FFF2-40B4-BE49-F238E27FC236}">
+                <a16:creationId xmlns:a16="http://schemas.microsoft.com/office/drawing/2014/main" id="{7C6648E7-1273-7B92-1364-C8D15B5452C2}"/>
+              </a:ext>
+            </a:extLst>
+          </p:cNvPr>
+          <p:cNvSpPr>
+            <a:spLocks noGrp="1"/>
+          </p:cNvSpPr>
+          <p:nvPr>
+            <p:ph type="sldNum" sz="quarter" idx="12"/>
+          </p:nvPr>
+        </p:nvSpPr>
+        <p:spPr/>
+        <p:txBody>
+          <a:bodyPr/>
+          <a:lstStyle/>
+          <a:p>
+            <a:fld id="{CF179DAE-D0A6-40C3-B8BC-6A97C268D03A}" type="slidenum">
+              <a:rPr lang="nl-NL" smtClean="0"/>
+              <a:t>23</a:t>
+            </a:fld>
+            <a:endParaRPr lang="nl-NL"/>
+          </a:p>
+        </p:txBody>
+      </p:sp>
+      <p:sp>
+        <p:nvSpPr>
+          <p:cNvPr id="4" name="Title 3">
+            <a:extLst>
+              <a:ext uri="{FF2B5EF4-FFF2-40B4-BE49-F238E27FC236}">
+                <a16:creationId xmlns:a16="http://schemas.microsoft.com/office/drawing/2014/main" id="{B68B52E9-027C-C112-B2D9-B6F54FC37BB5}"/>
+              </a:ext>
+            </a:extLst>
+          </p:cNvPr>
+          <p:cNvSpPr>
+            <a:spLocks noGrp="1"/>
+          </p:cNvSpPr>
+          <p:nvPr>
+            <p:ph type="title"/>
+          </p:nvPr>
+        </p:nvSpPr>
+        <p:spPr/>
+        <p:txBody>
+          <a:bodyPr/>
+          <a:lstStyle/>
+          <a:p>
+            <a:r>
+              <a:rPr lang="en-BE" dirty="0"/>
+              <a:t>Bedankt!</a:t>
+            </a:r>
+          </a:p>
+        </p:txBody>
+      </p:sp>
+      <p:sp>
+        <p:nvSpPr>
+          <p:cNvPr id="5" name="Text Placeholder 4">
+            <a:extLst>
+              <a:ext uri="{FF2B5EF4-FFF2-40B4-BE49-F238E27FC236}">
+                <a16:creationId xmlns:a16="http://schemas.microsoft.com/office/drawing/2014/main" id="{01FB8C09-03D3-1A59-6E7A-2C78B34B84CE}"/>
+              </a:ext>
+            </a:extLst>
+          </p:cNvPr>
+          <p:cNvSpPr>
+            <a:spLocks noGrp="1"/>
+          </p:cNvSpPr>
+          <p:nvPr>
+            <p:ph type="body" idx="1"/>
+          </p:nvPr>
+        </p:nvSpPr>
+        <p:spPr/>
+        <p:txBody>
+          <a:bodyPr/>
+          <a:lstStyle/>
+          <a:p>
+            <a:r>
+              <a:rPr lang="en-BE" dirty="0"/>
+              <a:t>Vincent &amp; Arne</a:t>
+            </a:r>
+          </a:p>
+        </p:txBody>
+      </p:sp>
+    </p:spTree>
+    <p:extLst>
+      <p:ext uri="{BB962C8B-B14F-4D97-AF65-F5344CB8AC3E}">
+        <p14:creationId xmlns:p14="http://schemas.microsoft.com/office/powerpoint/2010/main" val="2962070844"/>
       </p:ext>
     </p:extLst>
   </p:cSld>

</xml_diff>

<commit_message>
Updated defense, added zip
</commit_message>
<xml_diff>
--- a/defense.pptx
+++ b/defense.pptx
@@ -6,10 +6,10 @@
     <p:sldMasterId id="2147483694" r:id="rId2"/>
   </p:sldMasterIdLst>
   <p:notesMasterIdLst>
-    <p:notesMasterId r:id="rId26"/>
+    <p:notesMasterId r:id="rId27"/>
   </p:notesMasterIdLst>
   <p:handoutMasterIdLst>
-    <p:handoutMasterId r:id="rId27"/>
+    <p:handoutMasterId r:id="rId28"/>
   </p:handoutMasterIdLst>
   <p:sldIdLst>
     <p:sldId id="261" r:id="rId3"/>
@@ -24,17 +24,18 @@
     <p:sldId id="269" r:id="rId12"/>
     <p:sldId id="271" r:id="rId13"/>
     <p:sldId id="273" r:id="rId14"/>
-    <p:sldId id="270" r:id="rId15"/>
-    <p:sldId id="275" r:id="rId16"/>
-    <p:sldId id="276" r:id="rId17"/>
-    <p:sldId id="274" r:id="rId18"/>
-    <p:sldId id="277" r:id="rId19"/>
-    <p:sldId id="278" r:id="rId20"/>
-    <p:sldId id="279" r:id="rId21"/>
-    <p:sldId id="280" r:id="rId22"/>
-    <p:sldId id="281" r:id="rId23"/>
-    <p:sldId id="282" r:id="rId24"/>
-    <p:sldId id="283" r:id="rId25"/>
+    <p:sldId id="284" r:id="rId15"/>
+    <p:sldId id="270" r:id="rId16"/>
+    <p:sldId id="275" r:id="rId17"/>
+    <p:sldId id="276" r:id="rId18"/>
+    <p:sldId id="274" r:id="rId19"/>
+    <p:sldId id="277" r:id="rId20"/>
+    <p:sldId id="278" r:id="rId21"/>
+    <p:sldId id="279" r:id="rId22"/>
+    <p:sldId id="280" r:id="rId23"/>
+    <p:sldId id="281" r:id="rId24"/>
+    <p:sldId id="282" r:id="rId25"/>
+    <p:sldId id="283" r:id="rId26"/>
   </p:sldIdLst>
   <p:sldSz cx="12192000" cy="6858000"/>
   <p:notesSz cx="6858000" cy="9144000"/>
@@ -226,7 +227,7 @@
           <a:p>
             <a:fld id="{8F591CCF-F6FD-734B-854A-5BC033593B1E}" type="datetimeFigureOut">
               <a:rPr lang="nl-NL" smtClean="0"/>
-              <a:t>07-05-2024</a:t>
+              <a:t>08-05-2024</a:t>
             </a:fld>
             <a:endParaRPr lang="nl-NL"/>
           </a:p>
@@ -391,7 +392,7 @@
           <a:p>
             <a:fld id="{23C66214-DB21-4647-B5DA-0D17CA592867}" type="datetimeFigureOut">
               <a:rPr lang="nl-NL" smtClean="0"/>
-              <a:t>07-05-2024</a:t>
+              <a:t>08-05-2024</a:t>
             </a:fld>
             <a:endParaRPr lang="nl-NL"/>
           </a:p>
@@ -1380,7 +1381,7 @@
           <a:p>
             <a:fld id="{EA7240E7-EFE3-754C-9F55-72D4D6AFD9AB}" type="datetime1">
               <a:rPr lang="en-US" smtClean="0"/>
-              <a:t>5/7/24</a:t>
+              <a:t>5/8/24</a:t>
             </a:fld>
             <a:endParaRPr lang="nl-NL"/>
           </a:p>
@@ -1663,7 +1664,7 @@
           <a:p>
             <a:fld id="{F63262F4-A9CE-5B48-9D99-B1E93D5A08B9}" type="datetime1">
               <a:rPr lang="en-US" smtClean="0"/>
-              <a:t>5/7/24</a:t>
+              <a:t>5/8/24</a:t>
             </a:fld>
             <a:endParaRPr lang="nl-NL"/>
           </a:p>
@@ -1993,7 +1994,7 @@
           <a:p>
             <a:fld id="{D8FF683C-C768-A347-B474-DDB20DADE250}" type="datetime1">
               <a:rPr lang="en-US" smtClean="0"/>
-              <a:t>5/7/24</a:t>
+              <a:t>5/8/24</a:t>
             </a:fld>
             <a:endParaRPr lang="nl-NL"/>
           </a:p>
@@ -2312,7 +2313,7 @@
           <a:p>
             <a:fld id="{45958084-0BF9-ED48-8E93-EBC0FEB37BC7}" type="datetime1">
               <a:rPr lang="en-US" smtClean="0"/>
-              <a:t>5/7/24</a:t>
+              <a:t>5/8/24</a:t>
             </a:fld>
             <a:endParaRPr lang="nl-NL" dirty="0"/>
           </a:p>
@@ -2633,7 +2634,7 @@
           <a:p>
             <a:fld id="{B8FAF948-8F13-C44D-A93D-C7F192A157A0}" type="datetime1">
               <a:rPr lang="en-US" smtClean="0"/>
-              <a:t>5/7/24</a:t>
+              <a:t>5/8/24</a:t>
             </a:fld>
             <a:endParaRPr lang="nl-NL" dirty="0"/>
           </a:p>
@@ -2775,7 +2776,7 @@
           <a:p>
             <a:fld id="{918A7915-630E-024D-8633-3BF8BE4EF2C8}" type="datetime1">
               <a:rPr lang="en-US" smtClean="0"/>
-              <a:t>5/7/24</a:t>
+              <a:t>5/8/24</a:t>
             </a:fld>
             <a:endParaRPr lang="nl-NL"/>
           </a:p>
@@ -3259,7 +3260,7 @@
           <a:p>
             <a:fld id="{FF70C79D-665E-F94F-98FB-36550687BC52}" type="datetime1">
               <a:rPr lang="en-US" smtClean="0"/>
-              <a:t>5/7/24</a:t>
+              <a:t>5/8/24</a:t>
             </a:fld>
             <a:endParaRPr lang="nl-NL" dirty="0"/>
           </a:p>
@@ -3380,7 +3381,7 @@
           <a:p>
             <a:fld id="{3BC1C786-0978-784B-9B42-767AF018893B}" type="datetime1">
               <a:rPr lang="en-US" smtClean="0"/>
-              <a:t>5/7/24</a:t>
+              <a:t>5/8/24</a:t>
             </a:fld>
             <a:endParaRPr lang="nl-NL"/>
           </a:p>
@@ -3501,7 +3502,7 @@
           <a:p>
             <a:fld id="{1D3C2D15-35F9-5549-8FF2-76499ABCC33E}" type="datetime1">
               <a:rPr lang="en-US" smtClean="0"/>
-              <a:t>5/7/24</a:t>
+              <a:t>5/8/24</a:t>
             </a:fld>
             <a:endParaRPr lang="nl-NL"/>
           </a:p>
@@ -3683,7 +3684,7 @@
           <a:p>
             <a:fld id="{9BD70719-02D1-414F-BBD5-A7F7AA31DF17}" type="datetime1">
               <a:rPr lang="en-US" smtClean="0"/>
-              <a:t>5/7/24</a:t>
+              <a:t>5/8/24</a:t>
             </a:fld>
             <a:endParaRPr lang="nl-NL" dirty="0"/>
           </a:p>
@@ -3937,7 +3938,7 @@
           <a:p>
             <a:fld id="{6D241B3D-20EC-F943-A2D2-8D67C5D51821}" type="datetime1">
               <a:rPr lang="en-US" smtClean="0"/>
-              <a:t>5/7/24</a:t>
+              <a:t>5/8/24</a:t>
             </a:fld>
             <a:endParaRPr lang="nl-NL" dirty="0"/>
           </a:p>
@@ -4578,7 +4579,7 @@
           <a:p>
             <a:fld id="{6495B0A5-EEDD-9440-8CD6-BBF2103ED580}" type="datetime1">
               <a:rPr lang="en-US" smtClean="0"/>
-              <a:t>5/7/24</a:t>
+              <a:t>5/8/24</a:t>
             </a:fld>
             <a:endParaRPr lang="nl-NL" dirty="0"/>
           </a:p>
@@ -7790,6 +7791,176 @@
       </p:grpSpPr>
       <p:sp>
         <p:nvSpPr>
+          <p:cNvPr id="2" name="Content Placeholder 1">
+            <a:extLst>
+              <a:ext uri="{FF2B5EF4-FFF2-40B4-BE49-F238E27FC236}">
+                <a16:creationId xmlns:a16="http://schemas.microsoft.com/office/drawing/2014/main" id="{76501B76-73C7-96BA-4791-E3047124152B}"/>
+              </a:ext>
+            </a:extLst>
+          </p:cNvPr>
+          <p:cNvSpPr>
+            <a:spLocks noGrp="1"/>
+          </p:cNvSpPr>
+          <p:nvPr>
+            <p:ph idx="1"/>
+          </p:nvPr>
+        </p:nvSpPr>
+        <p:spPr/>
+        <p:txBody>
+          <a:bodyPr/>
+          <a:lstStyle/>
+          <a:p>
+            <a:r>
+              <a:rPr lang="en-BE" dirty="0"/>
+              <a:t>GitHub actions</a:t>
+            </a:r>
+          </a:p>
+          <a:p>
+            <a:r>
+              <a:rPr lang="en-BE" dirty="0"/>
+              <a:t>Belangrijkste methodes worden getest in unit_tests.py</a:t>
+            </a:r>
+          </a:p>
+          <a:p>
+            <a:pPr lvl="1"/>
+            <a:r>
+              <a:rPr lang="en-BE" dirty="0"/>
+              <a:t>Filteren grafen</a:t>
+            </a:r>
+          </a:p>
+          <a:p>
+            <a:pPr lvl="1"/>
+            <a:r>
+              <a:rPr lang="en-BE" dirty="0"/>
+              <a:t>Legaliteit filters testen</a:t>
+            </a:r>
+          </a:p>
+          <a:p>
+            <a:pPr lvl="1"/>
+            <a:r>
+              <a:rPr lang="en-BE" dirty="0"/>
+              <a:t>Genereren history</a:t>
+            </a:r>
+          </a:p>
+        </p:txBody>
+      </p:sp>
+      <p:sp>
+        <p:nvSpPr>
+          <p:cNvPr id="3" name="Footer Placeholder 2">
+            <a:extLst>
+              <a:ext uri="{FF2B5EF4-FFF2-40B4-BE49-F238E27FC236}">
+                <a16:creationId xmlns:a16="http://schemas.microsoft.com/office/drawing/2014/main" id="{EF1C883D-4A27-8D61-0BE9-680EF0E924A0}"/>
+              </a:ext>
+            </a:extLst>
+          </p:cNvPr>
+          <p:cNvSpPr>
+            <a:spLocks noGrp="1"/>
+          </p:cNvSpPr>
+          <p:nvPr>
+            <p:ph type="ftr" sz="quarter" idx="11"/>
+          </p:nvPr>
+        </p:nvSpPr>
+        <p:spPr/>
+        <p:txBody>
+          <a:bodyPr/>
+          <a:lstStyle/>
+          <a:p>
+            <a:r>
+              <a:rPr lang="nl-NL"/>
+              <a:t>Groep W&amp;T - Computerwetenschappen</a:t>
+            </a:r>
+          </a:p>
+        </p:txBody>
+      </p:sp>
+      <p:sp>
+        <p:nvSpPr>
+          <p:cNvPr id="4" name="Slide Number Placeholder 3">
+            <a:extLst>
+              <a:ext uri="{FF2B5EF4-FFF2-40B4-BE49-F238E27FC236}">
+                <a16:creationId xmlns:a16="http://schemas.microsoft.com/office/drawing/2014/main" id="{C4068E99-72B1-1B85-1A27-208251D524A1}"/>
+              </a:ext>
+            </a:extLst>
+          </p:cNvPr>
+          <p:cNvSpPr>
+            <a:spLocks noGrp="1"/>
+          </p:cNvSpPr>
+          <p:nvPr>
+            <p:ph type="sldNum" sz="quarter" idx="12"/>
+          </p:nvPr>
+        </p:nvSpPr>
+        <p:spPr/>
+        <p:txBody>
+          <a:bodyPr/>
+          <a:lstStyle/>
+          <a:p>
+            <a:fld id="{0A297500-7527-634B-90F4-69D0994C32B4}" type="slidenum">
+              <a:rPr lang="nl-NL" smtClean="0"/>
+              <a:t>13</a:t>
+            </a:fld>
+            <a:endParaRPr lang="nl-NL"/>
+          </a:p>
+        </p:txBody>
+      </p:sp>
+      <p:sp>
+        <p:nvSpPr>
+          <p:cNvPr id="5" name="Title 4">
+            <a:extLst>
+              <a:ext uri="{FF2B5EF4-FFF2-40B4-BE49-F238E27FC236}">
+                <a16:creationId xmlns:a16="http://schemas.microsoft.com/office/drawing/2014/main" id="{CF193EA2-10BC-9C08-FDCB-182CFEC78B31}"/>
+              </a:ext>
+            </a:extLst>
+          </p:cNvPr>
+          <p:cNvSpPr>
+            <a:spLocks noGrp="1"/>
+          </p:cNvSpPr>
+          <p:nvPr>
+            <p:ph type="title"/>
+          </p:nvPr>
+        </p:nvSpPr>
+        <p:spPr/>
+        <p:txBody>
+          <a:bodyPr/>
+          <a:lstStyle/>
+          <a:p>
+            <a:r>
+              <a:rPr lang="en-BE" dirty="0"/>
+              <a:t>Unit testing</a:t>
+            </a:r>
+          </a:p>
+        </p:txBody>
+      </p:sp>
+    </p:spTree>
+    <p:extLst>
+      <p:ext uri="{BB962C8B-B14F-4D97-AF65-F5344CB8AC3E}">
+        <p14:creationId xmlns:p14="http://schemas.microsoft.com/office/powerpoint/2010/main" val="2311236771"/>
+      </p:ext>
+    </p:extLst>
+  </p:cSld>
+  <p:clrMapOvr>
+    <a:masterClrMapping/>
+  </p:clrMapOvr>
+</p:sld>
+</file>
+
+<file path=ppt/slides/slide14.xml><?xml version="1.0" encoding="utf-8"?>
+<p:sld xmlns:a="http://schemas.openxmlformats.org/drawingml/2006/main" xmlns:r="http://schemas.openxmlformats.org/officeDocument/2006/relationships" xmlns:p="http://schemas.openxmlformats.org/presentationml/2006/main">
+  <p:cSld>
+    <p:spTree>
+      <p:nvGrpSpPr>
+        <p:cNvPr id="1" name=""/>
+        <p:cNvGrpSpPr/>
+        <p:nvPr/>
+      </p:nvGrpSpPr>
+      <p:grpSpPr>
+        <a:xfrm>
+          <a:off x="0" y="0"/>
+          <a:ext cx="0" cy="0"/>
+          <a:chOff x="0" y="0"/>
+          <a:chExt cx="0" cy="0"/>
+        </a:xfrm>
+      </p:grpSpPr>
+      <p:sp>
+        <p:nvSpPr>
           <p:cNvPr id="3" name="Footer Placeholder 2">
             <a:extLst>
               <a:ext uri="{FF2B5EF4-FFF2-40B4-BE49-F238E27FC236}">
@@ -7839,7 +8010,7 @@
           <a:p>
             <a:fld id="{0A297500-7527-634B-90F4-69D0994C32B4}" type="slidenum">
               <a:rPr lang="nl-NL" smtClean="0"/>
-              <a:t>13</a:t>
+              <a:t>14</a:t>
             </a:fld>
             <a:endParaRPr lang="nl-NL"/>
           </a:p>
@@ -8545,7 +8716,7 @@
 </p:sld>
 </file>
 
-<file path=ppt/slides/slide14.xml><?xml version="1.0" encoding="utf-8"?>
+<file path=ppt/slides/slide15.xml><?xml version="1.0" encoding="utf-8"?>
 <p:sld xmlns:a="http://schemas.openxmlformats.org/drawingml/2006/main" xmlns:r="http://schemas.openxmlformats.org/officeDocument/2006/relationships" xmlns:p="http://schemas.openxmlformats.org/presentationml/2006/main">
   <p:cSld>
     <p:spTree>
@@ -8585,7 +8756,7 @@
           <a:p>
             <a:fld id="{0A297500-7527-634B-90F4-69D0994C32B4}" type="slidenum">
               <a:rPr lang="nl-NL" smtClean="0"/>
-              <a:t>14</a:t>
+              <a:t>15</a:t>
             </a:fld>
             <a:endParaRPr lang="nl-NL"/>
           </a:p>
@@ -9538,7 +9709,7 @@
 </p:sld>
 </file>
 
-<file path=ppt/slides/slide15.xml><?xml version="1.0" encoding="utf-8"?>
+<file path=ppt/slides/slide16.xml><?xml version="1.0" encoding="utf-8"?>
 <p:sld xmlns:a="http://schemas.openxmlformats.org/drawingml/2006/main" xmlns:r="http://schemas.openxmlformats.org/officeDocument/2006/relationships" xmlns:p="http://schemas.openxmlformats.org/presentationml/2006/main">
   <p:cSld>
     <p:spTree>
@@ -9606,7 +9777,7 @@
           <a:p>
             <a:fld id="{0A297500-7527-634B-90F4-69D0994C32B4}" type="slidenum">
               <a:rPr lang="nl-NL" smtClean="0"/>
-              <a:t>15</a:t>
+              <a:t>16</a:t>
             </a:fld>
             <a:endParaRPr lang="nl-NL"/>
           </a:p>
@@ -10168,7 +10339,7 @@
 </p:sld>
 </file>
 
-<file path=ppt/slides/slide16.xml><?xml version="1.0" encoding="utf-8"?>
+<file path=ppt/slides/slide17.xml><?xml version="1.0" encoding="utf-8"?>
 <p:sld xmlns:a="http://schemas.openxmlformats.org/drawingml/2006/main" xmlns:r="http://schemas.openxmlformats.org/officeDocument/2006/relationships" xmlns:p="http://schemas.openxmlformats.org/presentationml/2006/main">
   <p:cSld>
     <p:spTree>
@@ -10236,7 +10407,7 @@
           <a:p>
             <a:fld id="{0A297500-7527-634B-90F4-69D0994C32B4}" type="slidenum">
               <a:rPr lang="nl-NL" smtClean="0"/>
-              <a:t>16</a:t>
+              <a:t>17</a:t>
             </a:fld>
             <a:endParaRPr lang="nl-NL"/>
           </a:p>
@@ -11011,7 +11182,7 @@
 </p:sld>
 </file>
 
-<file path=ppt/slides/slide17.xml><?xml version="1.0" encoding="utf-8"?>
+<file path=ppt/slides/slide18.xml><?xml version="1.0" encoding="utf-8"?>
 <p:sld xmlns:a="http://schemas.openxmlformats.org/drawingml/2006/main" xmlns:r="http://schemas.openxmlformats.org/officeDocument/2006/relationships" xmlns:p="http://schemas.openxmlformats.org/presentationml/2006/main">
   <p:cSld>
     <p:spTree>
@@ -11079,7 +11250,7 @@
           <a:p>
             <a:fld id="{0A297500-7527-634B-90F4-69D0994C32B4}" type="slidenum">
               <a:rPr lang="nl-NL" smtClean="0"/>
-              <a:t>17</a:t>
+              <a:t>18</a:t>
             </a:fld>
             <a:endParaRPr lang="nl-NL"/>
           </a:p>
@@ -11594,7 +11765,7 @@
 </p:sld>
 </file>
 
-<file path=ppt/slides/slide18.xml><?xml version="1.0" encoding="utf-8"?>
+<file path=ppt/slides/slide19.xml><?xml version="1.0" encoding="utf-8"?>
 <p:sld xmlns:a="http://schemas.openxmlformats.org/drawingml/2006/main" xmlns:r="http://schemas.openxmlformats.org/officeDocument/2006/relationships" xmlns:p="http://schemas.openxmlformats.org/presentationml/2006/main">
   <p:cSld>
     <p:spTree>
@@ -11662,7 +11833,7 @@
           <a:p>
             <a:fld id="{0A297500-7527-634B-90F4-69D0994C32B4}" type="slidenum">
               <a:rPr lang="nl-NL" smtClean="0"/>
-              <a:t>18</a:t>
+              <a:t>19</a:t>
             </a:fld>
             <a:endParaRPr lang="nl-NL"/>
           </a:p>
@@ -12435,7 +12606,222 @@
 </p:sld>
 </file>
 
-<file path=ppt/slides/slide19.xml><?xml version="1.0" encoding="utf-8"?>
+<file path=ppt/slides/slide2.xml><?xml version="1.0" encoding="utf-8"?>
+<p:sld xmlns:a="http://schemas.openxmlformats.org/drawingml/2006/main" xmlns:r="http://schemas.openxmlformats.org/officeDocument/2006/relationships" xmlns:p="http://schemas.openxmlformats.org/presentationml/2006/main">
+  <p:cSld>
+    <p:spTree>
+      <p:nvGrpSpPr>
+        <p:cNvPr id="1" name=""/>
+        <p:cNvGrpSpPr/>
+        <p:nvPr/>
+      </p:nvGrpSpPr>
+      <p:grpSpPr>
+        <a:xfrm>
+          <a:off x="0" y="0"/>
+          <a:ext cx="0" cy="0"/>
+          <a:chOff x="0" y="0"/>
+          <a:chExt cx="0" cy="0"/>
+        </a:xfrm>
+      </p:grpSpPr>
+      <p:sp>
+        <p:nvSpPr>
+          <p:cNvPr id="2" name="Content Placeholder 1">
+            <a:extLst>
+              <a:ext uri="{FF2B5EF4-FFF2-40B4-BE49-F238E27FC236}">
+                <a16:creationId xmlns:a16="http://schemas.microsoft.com/office/drawing/2014/main" id="{EED68804-B544-9205-8EED-4D7068718666}"/>
+              </a:ext>
+            </a:extLst>
+          </p:cNvPr>
+          <p:cNvSpPr>
+            <a:spLocks noGrp="1"/>
+          </p:cNvSpPr>
+          <p:nvPr>
+            <p:ph idx="1"/>
+          </p:nvPr>
+        </p:nvSpPr>
+        <p:spPr>
+          <a:xfrm>
+            <a:off x="527082" y="1237507"/>
+            <a:ext cx="11041200" cy="1442804"/>
+          </a:xfrm>
+        </p:spPr>
+        <p:txBody>
+          <a:bodyPr/>
+          <a:lstStyle/>
+          <a:p>
+            <a:r>
+              <a:rPr lang="nl-NL" dirty="0"/>
+              <a:t>Alleen stabiele versies op </a:t>
+            </a:r>
+            <a:r>
+              <a:rPr lang="en-BE" dirty="0">
+                <a:latin typeface="Andale Mono" panose="020B0509000000000004" pitchFamily="49" charset="0"/>
+              </a:rPr>
+              <a:t>main</a:t>
+            </a:r>
+          </a:p>
+          <a:p>
+            <a:r>
+              <a:rPr lang="en-BE" dirty="0"/>
+              <a:t>Nieuwe branch per stage van het project</a:t>
+            </a:r>
+          </a:p>
+          <a:p>
+            <a:r>
+              <a:rPr lang="en-BE" dirty="0"/>
+              <a:t>Foutje bij </a:t>
+            </a:r>
+            <a:r>
+              <a:rPr lang="en-BE" dirty="0">
+                <a:latin typeface="Andale Mono" panose="020B0509000000000004" pitchFamily="49" charset="0"/>
+              </a:rPr>
+              <a:t>stage5</a:t>
+            </a:r>
+            <a:r>
+              <a:rPr lang="en-BE" dirty="0"/>
+              <a:t> (merge later doorgevoerd)</a:t>
+            </a:r>
+          </a:p>
+          <a:p>
+            <a:endParaRPr lang="en-BE" dirty="0"/>
+          </a:p>
+        </p:txBody>
+      </p:sp>
+      <p:sp>
+        <p:nvSpPr>
+          <p:cNvPr id="3" name="Footer Placeholder 2">
+            <a:extLst>
+              <a:ext uri="{FF2B5EF4-FFF2-40B4-BE49-F238E27FC236}">
+                <a16:creationId xmlns:a16="http://schemas.microsoft.com/office/drawing/2014/main" id="{F4B95777-30B0-244C-2D4E-2D45363AC3F1}"/>
+              </a:ext>
+            </a:extLst>
+          </p:cNvPr>
+          <p:cNvSpPr>
+            <a:spLocks noGrp="1"/>
+          </p:cNvSpPr>
+          <p:nvPr>
+            <p:ph type="ftr" sz="quarter" idx="11"/>
+          </p:nvPr>
+        </p:nvSpPr>
+        <p:spPr/>
+        <p:txBody>
+          <a:bodyPr/>
+          <a:lstStyle/>
+          <a:p>
+            <a:r>
+              <a:rPr lang="nl-NL"/>
+              <a:t>Groep W&amp;T - Computerwetenschappen</a:t>
+            </a:r>
+          </a:p>
+        </p:txBody>
+      </p:sp>
+      <p:sp>
+        <p:nvSpPr>
+          <p:cNvPr id="4" name="Slide Number Placeholder 3">
+            <a:extLst>
+              <a:ext uri="{FF2B5EF4-FFF2-40B4-BE49-F238E27FC236}">
+                <a16:creationId xmlns:a16="http://schemas.microsoft.com/office/drawing/2014/main" id="{84C3A57E-4020-47DC-D7F5-7CC27B73F657}"/>
+              </a:ext>
+            </a:extLst>
+          </p:cNvPr>
+          <p:cNvSpPr>
+            <a:spLocks noGrp="1"/>
+          </p:cNvSpPr>
+          <p:nvPr>
+            <p:ph type="sldNum" sz="quarter" idx="12"/>
+          </p:nvPr>
+        </p:nvSpPr>
+        <p:spPr/>
+        <p:txBody>
+          <a:bodyPr/>
+          <a:lstStyle/>
+          <a:p>
+            <a:fld id="{0A297500-7527-634B-90F4-69D0994C32B4}" type="slidenum">
+              <a:rPr lang="nl-NL" smtClean="0"/>
+              <a:t>2</a:t>
+            </a:fld>
+            <a:endParaRPr lang="nl-NL"/>
+          </a:p>
+        </p:txBody>
+      </p:sp>
+      <p:sp>
+        <p:nvSpPr>
+          <p:cNvPr id="5" name="Title 4">
+            <a:extLst>
+              <a:ext uri="{FF2B5EF4-FFF2-40B4-BE49-F238E27FC236}">
+                <a16:creationId xmlns:a16="http://schemas.microsoft.com/office/drawing/2014/main" id="{0CE60C61-7405-7F69-A910-B15B6650340F}"/>
+              </a:ext>
+            </a:extLst>
+          </p:cNvPr>
+          <p:cNvSpPr>
+            <a:spLocks noGrp="1"/>
+          </p:cNvSpPr>
+          <p:nvPr>
+            <p:ph type="title"/>
+          </p:nvPr>
+        </p:nvSpPr>
+        <p:spPr/>
+        <p:txBody>
+          <a:bodyPr/>
+          <a:lstStyle/>
+          <a:p>
+            <a:r>
+              <a:rPr lang="en-BE" dirty="0"/>
+              <a:t>Overview timeline</a:t>
+            </a:r>
+          </a:p>
+        </p:txBody>
+      </p:sp>
+      <p:pic>
+        <p:nvPicPr>
+          <p:cNvPr id="20" name="Graphic 19">
+            <a:extLst>
+              <a:ext uri="{FF2B5EF4-FFF2-40B4-BE49-F238E27FC236}">
+                <a16:creationId xmlns:a16="http://schemas.microsoft.com/office/drawing/2014/main" id="{8E5FA6B2-ED85-718C-9124-D8FEE9512237}"/>
+              </a:ext>
+            </a:extLst>
+          </p:cNvPr>
+          <p:cNvPicPr>
+            <a:picLocks noChangeAspect="1"/>
+          </p:cNvPicPr>
+          <p:nvPr/>
+        </p:nvPicPr>
+        <p:blipFill>
+          <a:blip r:embed="rId2">
+            <a:extLst>
+              <a:ext uri="{96DAC541-7B7A-43D3-8B79-37D633B846F1}">
+                <asvg:svgBlip xmlns:asvg="http://schemas.microsoft.com/office/drawing/2016/SVG/main" r:embed="rId3"/>
+              </a:ext>
+            </a:extLst>
+          </a:blip>
+          <a:stretch>
+            <a:fillRect/>
+          </a:stretch>
+        </p:blipFill>
+        <p:spPr>
+          <a:xfrm>
+            <a:off x="153750" y="3062393"/>
+            <a:ext cx="11720990" cy="3036672"/>
+          </a:xfrm>
+          <a:prstGeom prst="rect">
+            <a:avLst/>
+          </a:prstGeom>
+        </p:spPr>
+      </p:pic>
+    </p:spTree>
+    <p:extLst>
+      <p:ext uri="{BB962C8B-B14F-4D97-AF65-F5344CB8AC3E}">
+        <p14:creationId xmlns:p14="http://schemas.microsoft.com/office/powerpoint/2010/main" val="3609063496"/>
+      </p:ext>
+    </p:extLst>
+  </p:cSld>
+  <p:clrMapOvr>
+    <a:masterClrMapping/>
+  </p:clrMapOvr>
+</p:sld>
+</file>
+
+<file path=ppt/slides/slide20.xml><?xml version="1.0" encoding="utf-8"?>
 <p:sld xmlns:a="http://schemas.openxmlformats.org/drawingml/2006/main" xmlns:r="http://schemas.openxmlformats.org/officeDocument/2006/relationships" xmlns:p="http://schemas.openxmlformats.org/presentationml/2006/main">
   <p:cSld>
     <p:spTree>
@@ -12621,7 +13007,7 @@
           <a:p>
             <a:fld id="{0A297500-7527-634B-90F4-69D0994C32B4}" type="slidenum">
               <a:rPr lang="nl-NL" smtClean="0"/>
-              <a:t>19</a:t>
+              <a:t>20</a:t>
             </a:fld>
             <a:endParaRPr lang="nl-NL"/>
           </a:p>
@@ -13443,222 +13829,7 @@
 </p:sld>
 </file>
 
-<file path=ppt/slides/slide2.xml><?xml version="1.0" encoding="utf-8"?>
-<p:sld xmlns:a="http://schemas.openxmlformats.org/drawingml/2006/main" xmlns:r="http://schemas.openxmlformats.org/officeDocument/2006/relationships" xmlns:p="http://schemas.openxmlformats.org/presentationml/2006/main">
-  <p:cSld>
-    <p:spTree>
-      <p:nvGrpSpPr>
-        <p:cNvPr id="1" name=""/>
-        <p:cNvGrpSpPr/>
-        <p:nvPr/>
-      </p:nvGrpSpPr>
-      <p:grpSpPr>
-        <a:xfrm>
-          <a:off x="0" y="0"/>
-          <a:ext cx="0" cy="0"/>
-          <a:chOff x="0" y="0"/>
-          <a:chExt cx="0" cy="0"/>
-        </a:xfrm>
-      </p:grpSpPr>
-      <p:sp>
-        <p:nvSpPr>
-          <p:cNvPr id="2" name="Content Placeholder 1">
-            <a:extLst>
-              <a:ext uri="{FF2B5EF4-FFF2-40B4-BE49-F238E27FC236}">
-                <a16:creationId xmlns:a16="http://schemas.microsoft.com/office/drawing/2014/main" id="{EED68804-B544-9205-8EED-4D7068718666}"/>
-              </a:ext>
-            </a:extLst>
-          </p:cNvPr>
-          <p:cNvSpPr>
-            <a:spLocks noGrp="1"/>
-          </p:cNvSpPr>
-          <p:nvPr>
-            <p:ph idx="1"/>
-          </p:nvPr>
-        </p:nvSpPr>
-        <p:spPr>
-          <a:xfrm>
-            <a:off x="527082" y="1237507"/>
-            <a:ext cx="11041200" cy="1442804"/>
-          </a:xfrm>
-        </p:spPr>
-        <p:txBody>
-          <a:bodyPr/>
-          <a:lstStyle/>
-          <a:p>
-            <a:r>
-              <a:rPr lang="nl-NL" dirty="0"/>
-              <a:t>Alleen stabiele versies op </a:t>
-            </a:r>
-            <a:r>
-              <a:rPr lang="en-BE" dirty="0">
-                <a:latin typeface="Andale Mono" panose="020B0509000000000004" pitchFamily="49" charset="0"/>
-              </a:rPr>
-              <a:t>main</a:t>
-            </a:r>
-          </a:p>
-          <a:p>
-            <a:r>
-              <a:rPr lang="en-BE" dirty="0"/>
-              <a:t>Nieuwe branch per stage van het project</a:t>
-            </a:r>
-          </a:p>
-          <a:p>
-            <a:r>
-              <a:rPr lang="en-BE" dirty="0"/>
-              <a:t>Foutje bij </a:t>
-            </a:r>
-            <a:r>
-              <a:rPr lang="en-BE" dirty="0">
-                <a:latin typeface="Andale Mono" panose="020B0509000000000004" pitchFamily="49" charset="0"/>
-              </a:rPr>
-              <a:t>stage5</a:t>
-            </a:r>
-            <a:r>
-              <a:rPr lang="en-BE" dirty="0"/>
-              <a:t> (merge later doorgevoerd)</a:t>
-            </a:r>
-          </a:p>
-          <a:p>
-            <a:endParaRPr lang="en-BE" dirty="0"/>
-          </a:p>
-        </p:txBody>
-      </p:sp>
-      <p:sp>
-        <p:nvSpPr>
-          <p:cNvPr id="3" name="Footer Placeholder 2">
-            <a:extLst>
-              <a:ext uri="{FF2B5EF4-FFF2-40B4-BE49-F238E27FC236}">
-                <a16:creationId xmlns:a16="http://schemas.microsoft.com/office/drawing/2014/main" id="{F4B95777-30B0-244C-2D4E-2D45363AC3F1}"/>
-              </a:ext>
-            </a:extLst>
-          </p:cNvPr>
-          <p:cNvSpPr>
-            <a:spLocks noGrp="1"/>
-          </p:cNvSpPr>
-          <p:nvPr>
-            <p:ph type="ftr" sz="quarter" idx="11"/>
-          </p:nvPr>
-        </p:nvSpPr>
-        <p:spPr/>
-        <p:txBody>
-          <a:bodyPr/>
-          <a:lstStyle/>
-          <a:p>
-            <a:r>
-              <a:rPr lang="nl-NL"/>
-              <a:t>Groep W&amp;T - Computerwetenschappen</a:t>
-            </a:r>
-          </a:p>
-        </p:txBody>
-      </p:sp>
-      <p:sp>
-        <p:nvSpPr>
-          <p:cNvPr id="4" name="Slide Number Placeholder 3">
-            <a:extLst>
-              <a:ext uri="{FF2B5EF4-FFF2-40B4-BE49-F238E27FC236}">
-                <a16:creationId xmlns:a16="http://schemas.microsoft.com/office/drawing/2014/main" id="{84C3A57E-4020-47DC-D7F5-7CC27B73F657}"/>
-              </a:ext>
-            </a:extLst>
-          </p:cNvPr>
-          <p:cNvSpPr>
-            <a:spLocks noGrp="1"/>
-          </p:cNvSpPr>
-          <p:nvPr>
-            <p:ph type="sldNum" sz="quarter" idx="12"/>
-          </p:nvPr>
-        </p:nvSpPr>
-        <p:spPr/>
-        <p:txBody>
-          <a:bodyPr/>
-          <a:lstStyle/>
-          <a:p>
-            <a:fld id="{0A297500-7527-634B-90F4-69D0994C32B4}" type="slidenum">
-              <a:rPr lang="nl-NL" smtClean="0"/>
-              <a:t>2</a:t>
-            </a:fld>
-            <a:endParaRPr lang="nl-NL"/>
-          </a:p>
-        </p:txBody>
-      </p:sp>
-      <p:sp>
-        <p:nvSpPr>
-          <p:cNvPr id="5" name="Title 4">
-            <a:extLst>
-              <a:ext uri="{FF2B5EF4-FFF2-40B4-BE49-F238E27FC236}">
-                <a16:creationId xmlns:a16="http://schemas.microsoft.com/office/drawing/2014/main" id="{0CE60C61-7405-7F69-A910-B15B6650340F}"/>
-              </a:ext>
-            </a:extLst>
-          </p:cNvPr>
-          <p:cNvSpPr>
-            <a:spLocks noGrp="1"/>
-          </p:cNvSpPr>
-          <p:nvPr>
-            <p:ph type="title"/>
-          </p:nvPr>
-        </p:nvSpPr>
-        <p:spPr/>
-        <p:txBody>
-          <a:bodyPr/>
-          <a:lstStyle/>
-          <a:p>
-            <a:r>
-              <a:rPr lang="en-BE" dirty="0"/>
-              <a:t>Overview timeline</a:t>
-            </a:r>
-          </a:p>
-        </p:txBody>
-      </p:sp>
-      <p:pic>
-        <p:nvPicPr>
-          <p:cNvPr id="20" name="Graphic 19">
-            <a:extLst>
-              <a:ext uri="{FF2B5EF4-FFF2-40B4-BE49-F238E27FC236}">
-                <a16:creationId xmlns:a16="http://schemas.microsoft.com/office/drawing/2014/main" id="{8E5FA6B2-ED85-718C-9124-D8FEE9512237}"/>
-              </a:ext>
-            </a:extLst>
-          </p:cNvPr>
-          <p:cNvPicPr>
-            <a:picLocks noChangeAspect="1"/>
-          </p:cNvPicPr>
-          <p:nvPr/>
-        </p:nvPicPr>
-        <p:blipFill>
-          <a:blip r:embed="rId2">
-            <a:extLst>
-              <a:ext uri="{96DAC541-7B7A-43D3-8B79-37D633B846F1}">
-                <asvg:svgBlip xmlns:asvg="http://schemas.microsoft.com/office/drawing/2016/SVG/main" r:embed="rId3"/>
-              </a:ext>
-            </a:extLst>
-          </a:blip>
-          <a:stretch>
-            <a:fillRect/>
-          </a:stretch>
-        </p:blipFill>
-        <p:spPr>
-          <a:xfrm>
-            <a:off x="153750" y="3062393"/>
-            <a:ext cx="11720990" cy="3036672"/>
-          </a:xfrm>
-          <a:prstGeom prst="rect">
-            <a:avLst/>
-          </a:prstGeom>
-        </p:spPr>
-      </p:pic>
-    </p:spTree>
-    <p:extLst>
-      <p:ext uri="{BB962C8B-B14F-4D97-AF65-F5344CB8AC3E}">
-        <p14:creationId xmlns:p14="http://schemas.microsoft.com/office/powerpoint/2010/main" val="3609063496"/>
-      </p:ext>
-    </p:extLst>
-  </p:cSld>
-  <p:clrMapOvr>
-    <a:masterClrMapping/>
-  </p:clrMapOvr>
-</p:sld>
-</file>
-
-<file path=ppt/slides/slide20.xml><?xml version="1.0" encoding="utf-8"?>
+<file path=ppt/slides/slide21.xml><?xml version="1.0" encoding="utf-8"?>
 <p:sld xmlns:a="http://schemas.openxmlformats.org/drawingml/2006/main" xmlns:r="http://schemas.openxmlformats.org/officeDocument/2006/relationships" xmlns:p="http://schemas.openxmlformats.org/presentationml/2006/main">
   <p:cSld>
     <p:spTree>
@@ -13715,20 +13886,61 @@
             <a:pPr lvl="1"/>
             <a:r>
               <a:rPr lang="en-BE" dirty="0">
-                <a:latin typeface="Arial" panose="020B0604020202020204" pitchFamily="34" charset="0"/>
+                <a:latin typeface="Andale Mono" panose="020B0509000000000004" pitchFamily="49" charset="0"/>
                 <a:cs typeface="Arial" panose="020B0604020202020204" pitchFamily="34" charset="0"/>
               </a:rPr>
-              <a:t>generate_graphs.sh wordt aangeroepen</a:t>
-            </a:r>
-          </a:p>
-          <a:p>
-            <a:pPr lvl="1"/>
+              <a:t>generate_graphs.sh </a:t>
+            </a:r>
             <a:r>
               <a:rPr lang="en-BE" dirty="0">
                 <a:latin typeface="Arial" panose="020B0604020202020204" pitchFamily="34" charset="0"/>
                 <a:cs typeface="Arial" panose="020B0604020202020204" pitchFamily="34" charset="0"/>
               </a:rPr>
+              <a:t>wordt aangeroepen</a:t>
+            </a:r>
+          </a:p>
+          <a:p>
+            <a:pPr lvl="1"/>
+            <a:r>
+              <a:rPr lang="en-BE" dirty="0">
+                <a:latin typeface="Arial" panose="020B0604020202020204" pitchFamily="34" charset="0"/>
+                <a:cs typeface="Arial" panose="020B0604020202020204" pitchFamily="34" charset="0"/>
+              </a:rPr>
               <a:t>Afbeeldingen verwijderd</a:t>
+            </a:r>
+          </a:p>
+          <a:p>
+            <a:pPr lvl="1"/>
+            <a:r>
+              <a:rPr lang="en-BE" dirty="0">
+                <a:latin typeface="Arial" panose="020B0604020202020204" pitchFamily="34" charset="0"/>
+                <a:cs typeface="Arial" panose="020B0604020202020204" pitchFamily="34" charset="0"/>
+              </a:rPr>
+              <a:t>JavaScript</a:t>
+            </a:r>
+          </a:p>
+          <a:p>
+            <a:pPr lvl="1"/>
+            <a:r>
+              <a:rPr lang="en-BE" dirty="0">
+                <a:latin typeface="Arial" panose="020B0604020202020204" pitchFamily="34" charset="0"/>
+                <a:cs typeface="Arial" panose="020B0604020202020204" pitchFamily="34" charset="0"/>
+              </a:rPr>
+              <a:t>SASS (.scss): </a:t>
+            </a:r>
+            <a:r>
+              <a:rPr lang="en-BE" i="1" dirty="0">
+                <a:latin typeface="Arial" panose="020B0604020202020204" pitchFamily="34" charset="0"/>
+                <a:cs typeface="Arial" panose="020B0604020202020204" pitchFamily="34" charset="0"/>
+              </a:rPr>
+              <a:t>enhanced</a:t>
+            </a:r>
+            <a:r>
+              <a:rPr lang="en-BE" dirty="0">
+                <a:latin typeface="Arial" panose="020B0604020202020204" pitchFamily="34" charset="0"/>
+                <a:cs typeface="Arial" panose="020B0604020202020204" pitchFamily="34" charset="0"/>
+              </a:rPr>
+              <a:t> versie van CSS</a:t>
             </a:r>
           </a:p>
           <a:p>
@@ -13794,7 +14006,7 @@
           <a:p>
             <a:fld id="{0A297500-7527-634B-90F4-69D0994C32B4}" type="slidenum">
               <a:rPr lang="nl-NL" smtClean="0"/>
-              <a:t>20</a:t>
+              <a:t>21</a:t>
             </a:fld>
             <a:endParaRPr lang="nl-NL"/>
           </a:p>
@@ -13917,7 +14129,7 @@
 </p:sld>
 </file>
 
-<file path=ppt/slides/slide21.xml><?xml version="1.0" encoding="utf-8"?>
+<file path=ppt/slides/slide22.xml><?xml version="1.0" encoding="utf-8"?>
 <p:sld xmlns:a="http://schemas.openxmlformats.org/drawingml/2006/main" xmlns:r="http://schemas.openxmlformats.org/officeDocument/2006/relationships" xmlns:p="http://schemas.openxmlformats.org/presentationml/2006/main">
   <p:cSld>
     <p:spTree>
@@ -14090,7 +14302,7 @@
           <a:p>
             <a:fld id="{0A297500-7527-634B-90F4-69D0994C32B4}" type="slidenum">
               <a:rPr lang="nl-NL" smtClean="0"/>
-              <a:t>21</a:t>
+              <a:t>22</a:t>
             </a:fld>
             <a:endParaRPr lang="nl-NL"/>
           </a:p>
@@ -14278,7 +14490,7 @@
 </p:sld>
 </file>
 
-<file path=ppt/slides/slide22.xml><?xml version="1.0" encoding="utf-8"?>
+<file path=ppt/slides/slide23.xml><?xml version="1.0" encoding="utf-8"?>
 <p:sld xmlns:a="http://schemas.openxmlformats.org/drawingml/2006/main" xmlns:r="http://schemas.openxmlformats.org/officeDocument/2006/relationships" xmlns:p="http://schemas.openxmlformats.org/presentationml/2006/main">
   <p:cSld>
     <p:spTree>
@@ -14346,7 +14558,7 @@
           <a:p>
             <a:fld id="{CF179DAE-D0A6-40C3-B8BC-6A97C268D03A}" type="slidenum">
               <a:rPr lang="nl-NL" smtClean="0"/>
-              <a:t>22</a:t>
+              <a:t>23</a:t>
             </a:fld>
             <a:endParaRPr lang="nl-NL"/>
           </a:p>
@@ -14421,7 +14633,7 @@
 </p:sld>
 </file>
 
-<file path=ppt/slides/slide23.xml><?xml version="1.0" encoding="utf-8"?>
+<file path=ppt/slides/slide24.xml><?xml version="1.0" encoding="utf-8"?>
 <p:sld xmlns:a="http://schemas.openxmlformats.org/drawingml/2006/main" xmlns:r="http://schemas.openxmlformats.org/officeDocument/2006/relationships" xmlns:p="http://schemas.openxmlformats.org/presentationml/2006/main">
   <p:cSld>
     <p:spTree>
@@ -14489,7 +14701,7 @@
           <a:p>
             <a:fld id="{CF179DAE-D0A6-40C3-B8BC-6A97C268D03A}" type="slidenum">
               <a:rPr lang="nl-NL" smtClean="0"/>
-              <a:t>23</a:t>
+              <a:t>24</a:t>
             </a:fld>
             <a:endParaRPr lang="nl-NL"/>
           </a:p>
@@ -14599,8 +14811,8 @@
         </p:nvSpPr>
         <p:spPr>
           <a:xfrm>
-            <a:off x="576000" y="1306376"/>
-            <a:ext cx="11041200" cy="4464000"/>
+            <a:off x="576000" y="1306375"/>
+            <a:ext cx="11041200" cy="4901227"/>
           </a:xfrm>
         </p:spPr>
         <p:txBody>
@@ -14631,7 +14843,7 @@
                 <a:effectLst/>
                 <a:latin typeface="-apple-system"/>
               </a:rPr>
-              <a:t>(22/04/24)</a:t>
+              <a:t>(22/03/24)</a:t>
             </a:r>
             <a:endParaRPr lang="en-GB" sz="1200" b="1" i="0" dirty="0">
               <a:solidFill>
@@ -14680,7 +14892,7 @@
                 <a:effectLst/>
                 <a:latin typeface="-apple-system"/>
               </a:rPr>
-              <a:t>(22/04/24)</a:t>
+              <a:t>(22/03/24)</a:t>
             </a:r>
             <a:endParaRPr lang="en-GB" sz="1200" b="1" i="0" dirty="0">
               <a:solidFill>
@@ -14778,7 +14990,7 @@
                 <a:effectLst/>
                 <a:latin typeface="-apple-system"/>
               </a:rPr>
-              <a:t>(23/04/24)</a:t>
+              <a:t>(23/03/24)</a:t>
             </a:r>
             <a:endParaRPr lang="en-GB" sz="1200" b="1" i="0" dirty="0">
               <a:solidFill>
@@ -15042,6 +15254,28 @@
             </a:r>
           </a:p>
           <a:p>
+            <a:pPr marL="285750" indent="-285750">
+              <a:buFont typeface="Arial" panose="020B0604020202020204" pitchFamily="34" charset="0"/>
+              <a:buChar char="•"/>
+            </a:pPr>
+            <a:r>
+              <a:rPr lang="en-GB" sz="1200" b="1" i="1" dirty="0">
+                <a:solidFill>
+                  <a:srgbClr val="2F4D5D"/>
+                </a:solidFill>
+                <a:latin typeface="-apple-system"/>
+              </a:rPr>
+              <a:t>2.1 (25/03/24)</a:t>
+            </a:r>
+            <a:endParaRPr lang="en-GB" sz="1200" b="1" i="1" dirty="0">
+              <a:solidFill>
+                <a:srgbClr val="2F4D5D"/>
+              </a:solidFill>
+              <a:effectLst/>
+              <a:latin typeface="-apple-system"/>
+            </a:endParaRPr>
+          </a:p>
+          <a:p>
             <a:pPr marL="742950" lvl="1" indent="-285750" algn="l">
               <a:buFont typeface="Arial" panose="020B0604020202020204" pitchFamily="34" charset="0"/>
               <a:buChar char="•"/>
@@ -15062,6 +15296,31 @@
               <a:buFont typeface="Arial" panose="020B0604020202020204" pitchFamily="34" charset="0"/>
               <a:buChar char="•"/>
             </a:pPr>
+            <a:endParaRPr lang="en-GB" sz="1200" dirty="0">
+              <a:solidFill>
+                <a:srgbClr val="2F4D5D"/>
+              </a:solidFill>
+              <a:latin typeface="-apple-system"/>
+            </a:endParaRPr>
+          </a:p>
+          <a:p>
+            <a:pPr marL="742950" lvl="1" indent="-285750" algn="l">
+              <a:buFont typeface="Arial" panose="020B0604020202020204" pitchFamily="34" charset="0"/>
+              <a:buChar char="•"/>
+            </a:pPr>
+            <a:endParaRPr lang="en-GB" sz="1200" b="0" i="0" dirty="0">
+              <a:solidFill>
+                <a:srgbClr val="2F4D5D"/>
+              </a:solidFill>
+              <a:effectLst/>
+              <a:latin typeface="-apple-system"/>
+            </a:endParaRPr>
+          </a:p>
+          <a:p>
+            <a:pPr marL="742950" lvl="1" indent="-285750" algn="l">
+              <a:buFont typeface="Arial" panose="020B0604020202020204" pitchFamily="34" charset="0"/>
+              <a:buChar char="•"/>
+            </a:pPr>
             <a:r>
               <a:rPr lang="en-GB" sz="1200" b="0" i="0" dirty="0">
                 <a:solidFill>
@@ -15106,7 +15365,7 @@
                 <a:effectLst/>
                 <a:latin typeface="-apple-system"/>
               </a:rPr>
-              <a:t>2.1 </a:t>
+              <a:t>2.2 </a:t>
             </a:r>
             <a:r>
               <a:rPr lang="en-GB" sz="1200" b="1" i="1" dirty="0">

</xml_diff>